<commit_message>
added info to the utvecklingsplan PP
</commit_message>
<xml_diff>
--- a/Processrapport/Utvecklingsplan.pptx
+++ b/Processrapport/Utvecklingsplan.pptx
@@ -264,7 +264,7 @@
           <a:p>
             <a:fld id="{E8AD8362-836D-4F68-89D4-827E7DA21A59}" type="datetimeFigureOut">
               <a:rPr lang="sv-SE" smtClean="0"/>
-              <a:t>2021-10-07</a:t>
+              <a:t>2021-10-11</a:t>
             </a:fld>
             <a:endParaRPr lang="sv-SE"/>
           </a:p>
@@ -462,7 +462,7 @@
           <a:p>
             <a:fld id="{E8AD8362-836D-4F68-89D4-827E7DA21A59}" type="datetimeFigureOut">
               <a:rPr lang="sv-SE" smtClean="0"/>
-              <a:t>2021-10-07</a:t>
+              <a:t>2021-10-11</a:t>
             </a:fld>
             <a:endParaRPr lang="sv-SE"/>
           </a:p>
@@ -670,7 +670,7 @@
           <a:p>
             <a:fld id="{E8AD8362-836D-4F68-89D4-827E7DA21A59}" type="datetimeFigureOut">
               <a:rPr lang="sv-SE" smtClean="0"/>
-              <a:t>2021-10-07</a:t>
+              <a:t>2021-10-11</a:t>
             </a:fld>
             <a:endParaRPr lang="sv-SE"/>
           </a:p>
@@ -868,7 +868,7 @@
           <a:p>
             <a:fld id="{E8AD8362-836D-4F68-89D4-827E7DA21A59}" type="datetimeFigureOut">
               <a:rPr lang="sv-SE" smtClean="0"/>
-              <a:t>2021-10-07</a:t>
+              <a:t>2021-10-11</a:t>
             </a:fld>
             <a:endParaRPr lang="sv-SE"/>
           </a:p>
@@ -1143,7 +1143,7 @@
           <a:p>
             <a:fld id="{E8AD8362-836D-4F68-89D4-827E7DA21A59}" type="datetimeFigureOut">
               <a:rPr lang="sv-SE" smtClean="0"/>
-              <a:t>2021-10-07</a:t>
+              <a:t>2021-10-11</a:t>
             </a:fld>
             <a:endParaRPr lang="sv-SE"/>
           </a:p>
@@ -1408,7 +1408,7 @@
           <a:p>
             <a:fld id="{E8AD8362-836D-4F68-89D4-827E7DA21A59}" type="datetimeFigureOut">
               <a:rPr lang="sv-SE" smtClean="0"/>
-              <a:t>2021-10-07</a:t>
+              <a:t>2021-10-11</a:t>
             </a:fld>
             <a:endParaRPr lang="sv-SE"/>
           </a:p>
@@ -1820,7 +1820,7 @@
           <a:p>
             <a:fld id="{E8AD8362-836D-4F68-89D4-827E7DA21A59}" type="datetimeFigureOut">
               <a:rPr lang="sv-SE" smtClean="0"/>
-              <a:t>2021-10-07</a:t>
+              <a:t>2021-10-11</a:t>
             </a:fld>
             <a:endParaRPr lang="sv-SE"/>
           </a:p>
@@ -1961,7 +1961,7 @@
           <a:p>
             <a:fld id="{E8AD8362-836D-4F68-89D4-827E7DA21A59}" type="datetimeFigureOut">
               <a:rPr lang="sv-SE" smtClean="0"/>
-              <a:t>2021-10-07</a:t>
+              <a:t>2021-10-11</a:t>
             </a:fld>
             <a:endParaRPr lang="sv-SE"/>
           </a:p>
@@ -2074,7 +2074,7 @@
           <a:p>
             <a:fld id="{E8AD8362-836D-4F68-89D4-827E7DA21A59}" type="datetimeFigureOut">
               <a:rPr lang="sv-SE" smtClean="0"/>
-              <a:t>2021-10-07</a:t>
+              <a:t>2021-10-11</a:t>
             </a:fld>
             <a:endParaRPr lang="sv-SE"/>
           </a:p>
@@ -2385,7 +2385,7 @@
           <a:p>
             <a:fld id="{E8AD8362-836D-4F68-89D4-827E7DA21A59}" type="datetimeFigureOut">
               <a:rPr lang="sv-SE" smtClean="0"/>
-              <a:t>2021-10-07</a:t>
+              <a:t>2021-10-11</a:t>
             </a:fld>
             <a:endParaRPr lang="sv-SE"/>
           </a:p>
@@ -2673,7 +2673,7 @@
           <a:p>
             <a:fld id="{E8AD8362-836D-4F68-89D4-827E7DA21A59}" type="datetimeFigureOut">
               <a:rPr lang="sv-SE" smtClean="0"/>
-              <a:t>2021-10-07</a:t>
+              <a:t>2021-10-11</a:t>
             </a:fld>
             <a:endParaRPr lang="sv-SE"/>
           </a:p>
@@ -2914,7 +2914,7 @@
           <a:p>
             <a:fld id="{E8AD8362-836D-4F68-89D4-827E7DA21A59}" type="datetimeFigureOut">
               <a:rPr lang="sv-SE" smtClean="0"/>
-              <a:t>2021-10-07</a:t>
+              <a:t>2021-10-11</a:t>
             </a:fld>
             <a:endParaRPr lang="sv-SE"/>
           </a:p>
@@ -3507,19 +3507,8 @@
                 <a:latin typeface="Helvetica" panose="020B0604020202020204" pitchFamily="34" charset="0"/>
                 <a:cs typeface="Helvetica" panose="020B0604020202020204" pitchFamily="34" charset="0"/>
               </a:rPr>
-              <a:t>Miljöansvarig på olika byråer och anläggningar som har med besöksnäringen </a:t>
-            </a:r>
-            <a:r>
-              <a:rPr lang="sv-SE">
-                <a:latin typeface="Helvetica" panose="020B0604020202020204" pitchFamily="34" charset="0"/>
-                <a:cs typeface="Helvetica" panose="020B0604020202020204" pitchFamily="34" charset="0"/>
-              </a:rPr>
-              <a:t>i Helsingborg att göra</a:t>
-            </a:r>
-            <a:endParaRPr lang="sv-SE" dirty="0">
-              <a:latin typeface="Helvetica" panose="020B0604020202020204" pitchFamily="34" charset="0"/>
-              <a:cs typeface="Helvetica" panose="020B0604020202020204" pitchFamily="34" charset="0"/>
-            </a:endParaRPr>
+              <a:t>Miljöansvarig på olika byråer och anläggningar som arbetar inom besöksnäringen i Helsingborg</a:t>
+            </a:r>
           </a:p>
           <a:p>
             <a:endParaRPr lang="sv-SE" dirty="0">
@@ -3611,7 +3600,31 @@
           <a:bodyPr/>
           <a:lstStyle/>
           <a:p>
-            <a:endParaRPr lang="sv-SE"/>
+            <a:r>
+              <a:rPr lang="sv-SE" dirty="0"/>
+              <a:t>En kombination av iterativ och lättrörlig processmodell. </a:t>
+            </a:r>
+          </a:p>
+          <a:p>
+            <a:r>
+              <a:rPr lang="sv-SE" dirty="0"/>
+              <a:t>SCRUM</a:t>
+            </a:r>
+          </a:p>
+          <a:p>
+            <a:r>
+              <a:rPr lang="sv-SE" dirty="0"/>
+              <a:t>Korta sprinter!</a:t>
+            </a:r>
+          </a:p>
+          <a:p>
+            <a:r>
+              <a:rPr lang="sv-SE" dirty="0"/>
+              <a:t>Experimenterar!</a:t>
+            </a:r>
+          </a:p>
+          <a:p>
+            <a:endParaRPr lang="sv-SE" dirty="0"/>
           </a:p>
         </p:txBody>
       </p:sp>
@@ -3694,7 +3707,7 @@
           <a:bodyPr/>
           <a:lstStyle/>
           <a:p>
-            <a:endParaRPr lang="sv-SE"/>
+            <a:endParaRPr lang="sv-SE" dirty="0"/>
           </a:p>
         </p:txBody>
       </p:sp>
@@ -3780,7 +3793,22 @@
           <a:bodyPr/>
           <a:lstStyle/>
           <a:p>
-            <a:endParaRPr lang="sv-SE"/>
+            <a:r>
+              <a:rPr lang="sv-SE" dirty="0"/>
+              <a:t>17 december 2021</a:t>
+            </a:r>
+          </a:p>
+          <a:p>
+            <a:r>
+              <a:rPr lang="sv-SE" dirty="0"/>
+              <a:t>Acceptanstest</a:t>
+            </a:r>
+          </a:p>
+          <a:p>
+            <a:r>
+              <a:rPr lang="sv-SE" dirty="0"/>
+              <a:t>Presentation med livedemo</a:t>
+            </a:r>
           </a:p>
         </p:txBody>
       </p:sp>
@@ -3840,7 +3868,7 @@
                 <a:latin typeface="Helvetica" panose="020B0604020202020204" pitchFamily="34" charset="0"/>
                 <a:cs typeface="Helvetica" panose="020B0604020202020204" pitchFamily="34" charset="0"/>
               </a:rPr>
-              <a:t>Tidplan</a:t>
+              <a:t>Tidsplan</a:t>
             </a:r>
           </a:p>
         </p:txBody>
@@ -3866,7 +3894,39 @@
           <a:bodyPr/>
           <a:lstStyle/>
           <a:p>
-            <a:endParaRPr lang="sv-SE"/>
+            <a:r>
+              <a:rPr lang="sv-SE" dirty="0"/>
+              <a:t>Schemat utgår från </a:t>
+            </a:r>
+            <a:r>
+              <a:rPr lang="sv-SE" dirty="0" err="1"/>
+              <a:t>enveckorssprints</a:t>
+            </a:r>
+            <a:endParaRPr lang="sv-SE" dirty="0"/>
+          </a:p>
+          <a:p>
+            <a:r>
+              <a:rPr lang="sv-SE" dirty="0"/>
+              <a:t>Vi ska vara klara med UML och ER på fredag (sprint 1 slut)</a:t>
+            </a:r>
+          </a:p>
+          <a:p>
+            <a:r>
+              <a:rPr lang="sv-SE" dirty="0"/>
+              <a:t>Sätta upp en server under sprint 2</a:t>
+            </a:r>
+          </a:p>
+          <a:p>
+            <a:r>
+              <a:rPr lang="sv-SE" dirty="0"/>
+              <a:t>Ha en ”fungerande” webbsida från och med sprint 2</a:t>
+            </a:r>
+          </a:p>
+          <a:p>
+            <a:r>
+              <a:rPr lang="sv-SE" dirty="0"/>
+              <a:t>Löpande funktionstest varannan vecka från och med sprint 2</a:t>
+            </a:r>
           </a:p>
         </p:txBody>
       </p:sp>

</xml_diff>